<commit_message>
build.gradle PostgreSQL JDBC 의존성 제거
</commit_message>
<xml_diff>
--- a/doc/SpringWebFlux_Chat-Server.pptx
+++ b/doc/SpringWebFlux_Chat-Server.pptx
@@ -243,7 +243,7 @@
           <a:p>
             <a:fld id="{C9670666-FF55-43B8-9795-5FA31CF289D2}" type="datetimeFigureOut">
               <a:rPr lang="ko-KR" altLang="en-US" smtClean="0"/>
-              <a:t>2025-07-07</a:t>
+              <a:t>2025-07-09</a:t>
             </a:fld>
             <a:endParaRPr lang="ko-KR" altLang="en-US"/>
           </a:p>
@@ -420,7 +420,7 @@
           <a:p>
             <a:fld id="{02D79A03-1866-43A1-BC70-6FD948B0FB74}" type="datetimeFigureOut">
               <a:rPr lang="ko-KR" altLang="en-US" smtClean="0"/>
-              <a:t>2025-07-07</a:t>
+              <a:t>2025-07-09</a:t>
             </a:fld>
             <a:endParaRPr lang="ko-KR" altLang="en-US"/>
           </a:p>
@@ -1004,7 +1004,7 @@
           <a:p>
             <a:fld id="{19357051-4747-4AC9-87FB-DDD9EB7F621F}" type="datetime1">
               <a:rPr lang="ko-KR" altLang="en-US" smtClean="0"/>
-              <a:t>2025-07-07</a:t>
+              <a:t>2025-07-09</a:t>
             </a:fld>
             <a:endParaRPr lang="ko-KR" altLang="en-US"/>
           </a:p>
@@ -2165,10 +2165,10 @@
       </p:sp>
       <p:pic>
         <p:nvPicPr>
-          <p:cNvPr id="3" name="그림 2">
+          <p:cNvPr id="4" name="그림 3">
             <a:extLst>
               <a:ext uri="{FF2B5EF4-FFF2-40B4-BE49-F238E27FC236}">
-                <a16:creationId xmlns:a16="http://schemas.microsoft.com/office/drawing/2014/main" id="{697BB9E3-A383-5BE2-74B5-1ED59FDA7E9D}"/>
+                <a16:creationId xmlns:a16="http://schemas.microsoft.com/office/drawing/2014/main" id="{F5DAE88F-55C1-0800-E730-D33A9EAA039C}"/>
               </a:ext>
             </a:extLst>
           </p:cNvPr>
@@ -2191,8 +2191,8 @@
         </p:blipFill>
         <p:spPr>
           <a:xfrm>
-            <a:off x="387791" y="1459326"/>
-            <a:ext cx="11059886" cy="1657636"/>
+            <a:off x="385614" y="1443642"/>
+            <a:ext cx="10545148" cy="1515910"/>
           </a:xfrm>
           <a:prstGeom prst="rect">
             <a:avLst/>

</xml_diff>